<commit_message>
ppt project name change
</commit_message>
<xml_diff>
--- a/Documentation/Zeroth review ppt.pptx
+++ b/Documentation/Zeroth review ppt.pptx
@@ -3277,7 +3277,7 @@
                 <a:latin typeface="Times New Roman" panose="02020603050405020304" pitchFamily="18" charset="0"/>
                 <a:cs typeface="Times New Roman" panose="02020603050405020304" pitchFamily="18" charset="0"/>
               </a:rPr>
-              <a:t>Essay Meter</a:t>
+              <a:t>Essay Grader</a:t>
             </a:r>
           </a:p>
           <a:p>
@@ -3929,16 +3929,12 @@
           <a:p>
             <a:pPr algn="just"/>
             <a:r>
+              <a:rPr lang="en-IN" b="1" u="sng" dirty="0"/>
+              <a:t>Essay Grader</a:t>
+            </a:r>
+            <a:r>
               <a:rPr lang="en-IN" dirty="0"/>
-              <a:t>The project &lt;</a:t>
-            </a:r>
-            <a:r>
-              <a:rPr lang="en-IN" dirty="0" err="1"/>
-              <a:t>project_name</a:t>
-            </a:r>
-            <a:r>
-              <a:rPr lang="en-IN" dirty="0"/>
-              <a:t>&gt; is a product which gives linguistic support to all our users and enhance their English writing skill.</a:t>
+              <a:t> is a product which gives linguistic support to all our users and enhance their English writing skill.</a:t>
             </a:r>
           </a:p>
           <a:p>
@@ -3950,16 +3946,12 @@
           </a:p>
           <a:p>
             <a:r>
+              <a:rPr lang="en-IN" b="1" u="sng" dirty="0"/>
+              <a:t>Essay Grader</a:t>
+            </a:r>
+            <a:r>
               <a:rPr lang="en-IN" dirty="0"/>
-              <a:t>&lt;</a:t>
-            </a:r>
-            <a:r>
-              <a:rPr lang="en-IN" dirty="0" err="1"/>
-              <a:t>project_name</a:t>
-            </a:r>
-            <a:r>
-              <a:rPr lang="en-IN" dirty="0"/>
-              <a:t>&gt; also provides an attractive dashboard to our users to keep track of their scores and their essays.</a:t>
+              <a:t> also provides an attractive dashboard to our users to keep track of their scores and their essays.</a:t>
             </a:r>
           </a:p>
           <a:p>
@@ -4021,16 +4013,12 @@
           </a:p>
           <a:p>
             <a:r>
+              <a:rPr lang="en-IN" b="1" u="sng" dirty="0"/>
+              <a:t>Essay Grader</a:t>
+            </a:r>
+            <a:r>
               <a:rPr lang="en-IN" dirty="0"/>
-              <a:t>&lt;</a:t>
-            </a:r>
-            <a:r>
-              <a:rPr lang="en-IN" dirty="0" err="1"/>
-              <a:t>project_name</a:t>
-            </a:r>
-            <a:r>
-              <a:rPr lang="en-IN" dirty="0"/>
-              <a:t>&gt; will have plagiarism feature to check the authenticity of the essay.</a:t>
+              <a:t> will have plagiarism feature to check the authenticity of the essay.</a:t>
             </a:r>
           </a:p>
           <a:p>
@@ -4296,15 +4284,7 @@
           <a:p>
             <a:r>
               <a:rPr lang="en-US" dirty="0"/>
-              <a:t>Architecture of &lt;</a:t>
-            </a:r>
-            <a:r>
-              <a:rPr lang="en-US" dirty="0" err="1"/>
-              <a:t>project_name</a:t>
-            </a:r>
-            <a:r>
-              <a:rPr lang="en-US" dirty="0"/>
-              <a:t>&gt;</a:t>
+              <a:t>Architecture of Essay Grader</a:t>
             </a:r>
           </a:p>
         </p:txBody>

</xml_diff>

<commit_message>
ppt change - 3rd person writings
</commit_message>
<xml_diff>
--- a/Documentation/Zeroth review ppt.pptx
+++ b/Documentation/Zeroth review ppt.pptx
@@ -3384,7 +3384,7 @@
           <p:nvPr>
             <p:extLst>
               <p:ext uri="{D42A27DB-BD31-4B8C-83A1-F6EECF244321}">
-                <p14:modId xmlns:p14="http://schemas.microsoft.com/office/powerpoint/2010/main" val="1570291515"/>
+                <p14:modId xmlns:p14="http://schemas.microsoft.com/office/powerpoint/2010/main" val="1868442985"/>
               </p:ext>
             </p:extLst>
           </p:nvPr>
@@ -3692,7 +3692,7 @@
                       <a:pPr algn="ctr"/>
                       <a:r>
                         <a:rPr lang="en-IN" dirty="0"/>
-                        <a:t>Assistant Professor</a:t>
+                        <a:t>Professor</a:t>
                       </a:r>
                     </a:p>
                   </a:txBody>
@@ -3783,7 +3783,7 @@
         </p:spPr>
         <p:txBody>
           <a:bodyPr>
-            <a:normAutofit fontScale="92500" lnSpcReduction="10000"/>
+            <a:normAutofit/>
           </a:bodyPr>
           <a:lstStyle/>
           <a:p>
@@ -3801,7 +3801,7 @@
             </a:pPr>
             <a:r>
               <a:rPr lang="en-IN" dirty="0"/>
-              <a:t>The primary objective of this project is to evaluate a given essay’s various parameters and help people to improve their English writing skill.</a:t>
+              <a:t>The primary objective of this project is to evaluate a given essay and provide suggestion to improve their English writing skill.</a:t>
             </a:r>
           </a:p>
           <a:p>
@@ -3810,41 +3810,8 @@
             </a:pPr>
             <a:r>
               <a:rPr lang="en-IN" dirty="0"/>
-              <a:t>The objective is achieved by providing a platform – web application – for our users to evaluate and maintain log for their texts.</a:t>
-            </a:r>
-          </a:p>
-          <a:p>
-            <a:pPr marL="457200" indent="-457200" algn="just">
-              <a:buAutoNum type="arabicPeriod"/>
-            </a:pPr>
-            <a:r>
-              <a:rPr lang="en-IN" dirty="0"/>
-              <a:t>We use multiple trained neural network modals to evaluate various aspects of the essay and produce an overall score on a scale of 0-10 where 0 is the lowest and 10 is highest.</a:t>
-            </a:r>
-          </a:p>
-          <a:p>
-            <a:pPr marL="457200" indent="-457200" algn="just">
-              <a:buAutoNum type="arabicPeriod"/>
-            </a:pPr>
-            <a:r>
-              <a:rPr lang="en-IN" dirty="0"/>
-              <a:t>Our project targets the audience who are looking to evaluate their essays. For example, a person who is looking to take Graduate Record Examination (GRE) can use our platform to improve their score in Analytical Writing Assessment (AWA) section. </a:t>
-            </a:r>
-          </a:p>
-          <a:p>
-            <a:pPr marL="457200" indent="-457200" algn="just">
-              <a:buAutoNum type="arabicPeriod"/>
-            </a:pPr>
-            <a:r>
-              <a:rPr lang="en-IN" dirty="0"/>
-              <a:t>We also plan to make our whole product as a service where other platform can integrate our service to their platform using an API key of our service. The service will be hosted on any existing cloud architecture like Amazon Web Services (AWS), Google Cloud Platform (GCP), Microsoft Azure, etc,.  </a:t>
-            </a:r>
-          </a:p>
-          <a:p>
-            <a:pPr marL="457200" indent="-457200">
-              <a:buAutoNum type="arabicPeriod"/>
-            </a:pPr>
-            <a:endParaRPr lang="en-IN" dirty="0"/>
+              <a:t>Our project seeks to help the audience who are looking to grade their essays according to international standards. </a:t>
+            </a:r>
           </a:p>
         </p:txBody>
       </p:sp>
@@ -3929,29 +3896,36 @@
           <a:p>
             <a:pPr algn="just"/>
             <a:r>
-              <a:rPr lang="en-IN" b="1" u="sng" dirty="0"/>
-              <a:t>Essay Grader</a:t>
-            </a:r>
-            <a:r>
               <a:rPr lang="en-IN" dirty="0"/>
-              <a:t> is a product which gives linguistic support to all our users and enhance their English writing skill.</a:t>
+              <a:t>Our project gives linguistic support to all the users and check the authenticity of the essay.</a:t>
             </a:r>
           </a:p>
           <a:p>
             <a:pPr algn="just"/>
             <a:r>
               <a:rPr lang="en-IN" dirty="0"/>
-              <a:t>To integrate our primary feature in other software, we host our primary service in cloud architecture and use our API keys to access it securely.</a:t>
-            </a:r>
-          </a:p>
-          <a:p>
-            <a:r>
-              <a:rPr lang="en-IN" b="1" u="sng" dirty="0"/>
-              <a:t>Essay Grader</a:t>
-            </a:r>
+              <a:t>For example, if a GRE or IELTS candidate looking for someone to evaluate their essay, our project will help them with grading of their essay and provide suggestion to improve their writing skill. This certainly reduces time and risk of falsified evaluation of the passage.</a:t>
+            </a:r>
+          </a:p>
+          <a:p>
+            <a:pPr algn="just"/>
             <a:r>
               <a:rPr lang="en-IN" dirty="0"/>
-              <a:t> also provides an attractive dashboard to our users to keep track of their scores and their essays.</a:t>
+              <a:t>To integrate the primary feature in other software, project’s primary service is hosted in cloud architecture and use API keys to access it securely.</a:t>
+            </a:r>
+          </a:p>
+          <a:p>
+            <a:r>
+              <a:rPr lang="en-IN" dirty="0"/>
+              <a:t>This</a:t>
+            </a:r>
+            <a:r>
+              <a:rPr lang="en-IN" b="1" dirty="0"/>
+              <a:t> </a:t>
+            </a:r>
+            <a:r>
+              <a:rPr lang="en-IN" dirty="0"/>
+              <a:t>also provides an attractive dashboard to the users to keep track of their scores and their essays.</a:t>
             </a:r>
           </a:p>
           <a:p>
@@ -4004,25 +3978,6 @@
               <a:rPr lang="en-IN" dirty="0"/>
               <a:t>Sentence complexity.</a:t>
             </a:r>
-          </a:p>
-          <a:p>
-            <a:r>
-              <a:rPr lang="en-IN" dirty="0"/>
-              <a:t>The number of parameters used will increase in the future to provide a micro evaluation of the essays.</a:t>
-            </a:r>
-          </a:p>
-          <a:p>
-            <a:r>
-              <a:rPr lang="en-IN" b="1" u="sng" dirty="0"/>
-              <a:t>Essay Grader</a:t>
-            </a:r>
-            <a:r>
-              <a:rPr lang="en-IN" dirty="0"/>
-              <a:t> will have plagiarism feature to check the authenticity of the essay.</a:t>
-            </a:r>
-          </a:p>
-          <a:p>
-            <a:endParaRPr lang="en-IN" dirty="0"/>
           </a:p>
           <a:p>
             <a:endParaRPr lang="en-IN" dirty="0"/>
@@ -4110,25 +4065,25 @@
         </p:spPr>
         <p:txBody>
           <a:bodyPr>
-            <a:normAutofit lnSpcReduction="10000"/>
+            <a:normAutofit fontScale="92500" lnSpcReduction="10000"/>
           </a:bodyPr>
           <a:lstStyle/>
           <a:p>
             <a:r>
               <a:rPr lang="en-IN" dirty="0"/>
-              <a:t>We achieve our feature extraction goal using multiple trained neural network models where each model will do a particular task.</a:t>
+              <a:t>Project’s feature extraction goal is achieved using multiple trained neural network models where each model will do a particular task.</a:t>
             </a:r>
           </a:p>
           <a:p>
             <a:r>
               <a:rPr lang="en-IN" dirty="0"/>
-              <a:t>Programming language: Python</a:t>
+              <a:t>Python is used as our programming language since it has wide range of supports and package.</a:t>
             </a:r>
           </a:p>
           <a:p>
             <a:r>
               <a:rPr lang="en-IN" dirty="0"/>
-              <a:t>We have several international journals as reference to support our feasibility of our project within the speculated time. The journals are explained further in Literature Survey.</a:t>
+              <a:t>There are several international journals as reference to support our feasibility of our project within the speculated time. The journals are explained further in Literature Survey.</a:t>
             </a:r>
           </a:p>
           <a:p>
@@ -4187,10 +4142,9 @@
               <a:buAutoNum type="arabicPeriod"/>
             </a:pPr>
             <a:r>
-              <a:rPr lang="en-IN" dirty="0" err="1"/>
-              <a:t>JQuery</a:t>
-            </a:r>
-            <a:endParaRPr lang="en-IN" dirty="0"/>
+              <a:rPr lang="en-IN" dirty="0"/>
+              <a:t>Angular JS</a:t>
+            </a:r>
           </a:p>
           <a:p>
             <a:pPr marL="1028700" lvl="2" indent="-342900">
@@ -4198,6 +4152,15 @@
             </a:pPr>
             <a:r>
               <a:rPr lang="en-IN" dirty="0"/>
+              <a:t>jQuery</a:t>
+            </a:r>
+          </a:p>
+          <a:p>
+            <a:pPr marL="1028700" lvl="2" indent="-342900">
+              <a:buAutoNum type="arabicPeriod"/>
+            </a:pPr>
+            <a:r>
+              <a:rPr lang="en-IN" dirty="0"/>
               <a:t>Chart JS  </a:t>
             </a:r>
           </a:p>
@@ -4215,10 +4178,9 @@
               <a:buAutoNum type="arabicPeriod"/>
             </a:pPr>
             <a:r>
-              <a:rPr lang="en-IN" dirty="0" err="1"/>
-              <a:t>Tensorflow</a:t>
-            </a:r>
-            <a:endParaRPr lang="en-IN" dirty="0"/>
+              <a:rPr lang="en-IN" dirty="0"/>
+              <a:t>TensorFlow</a:t>
+            </a:r>
           </a:p>
           <a:p>
             <a:pPr marL="1028700" lvl="2" indent="-342900">
@@ -4228,12 +4190,6 @@
               <a:rPr lang="en-IN" dirty="0"/>
               <a:t>Pandas</a:t>
             </a:r>
-          </a:p>
-          <a:p>
-            <a:pPr marL="0" indent="0">
-              <a:buNone/>
-            </a:pPr>
-            <a:endParaRPr lang="en-IN" dirty="0"/>
           </a:p>
         </p:txBody>
       </p:sp>
@@ -4394,19 +4350,13 @@
         </p:spPr>
         <p:txBody>
           <a:bodyPr>
-            <a:normAutofit lnSpcReduction="10000"/>
+            <a:normAutofit/>
           </a:bodyPr>
           <a:lstStyle/>
           <a:p>
             <a:r>
-              <a:rPr lang="en-US" dirty="0"/>
-              <a:t>With the support of several concepts used in the international journal and my own ideas will lead to successful implementation of the project.</a:t>
-            </a:r>
-          </a:p>
-          <a:p>
-            <a:r>
-              <a:rPr lang="en-US" dirty="0"/>
-              <a:t>We use primary features of 2 international journals </a:t>
+              <a:rPr lang="en-US" b="1" dirty="0"/>
+              <a:t>Two international journals are used as our reference </a:t>
             </a:r>
           </a:p>
           <a:p>
@@ -4414,8 +4364,8 @@
               <a:buAutoNum type="arabicPeriod"/>
             </a:pPr>
             <a:r>
-              <a:rPr lang="en-US" dirty="0"/>
-              <a:t>Text Classification using Different Feature Extraction Approach</a:t>
+              <a:rPr lang="en-US" sz="2000" dirty="0"/>
+              <a:t>Text Classification using Different Feature Extraction Approach.</a:t>
             </a:r>
           </a:p>
           <a:p>
@@ -4423,20 +4373,52 @@
               <a:buAutoNum type="arabicPeriod"/>
             </a:pPr>
             <a:r>
+              <a:rPr lang="en-US" sz="2000" dirty="0"/>
+              <a:t>Analysis of Text Categorization Represented With Word Embeddings Using Homogeneous Classifiers.</a:t>
+            </a:r>
+          </a:p>
+          <a:p>
+            <a:r>
+              <a:rPr lang="en-US" b="1" u="sng" dirty="0"/>
+              <a:t>Paper 1 </a:t>
+            </a:r>
+            <a:r>
               <a:rPr lang="en-US" dirty="0"/>
-              <a:t>Analysis of Text Categorization Represented With Word Embeddings Using Homogeneous Classifiers </a:t>
-            </a:r>
-          </a:p>
-          <a:p>
+              <a:t>is published in IEEE on 06/06/2019 with DOI number </a:t>
+            </a:r>
+            <a:r>
+              <a:rPr lang="en-IN" u="sng" dirty="0">
+                <a:hlinkClick r:id="rId2"/>
+              </a:rPr>
+              <a:t>10.1109/eStream.2019.8732167</a:t>
+            </a:r>
             <a:r>
               <a:rPr lang="en-US" dirty="0"/>
-              <a:t>Paper 1 uses Term Frequency Inverse Document Frequency (TF-IDF) weighing scheme to extract feature’s advantage and uses Latent Semantic Analysis (LSA) and Linear Discriminant Analysis (LDA) to overcome TF-IDF’s disadvantage.</a:t>
-            </a:r>
-          </a:p>
-          <a:p>
+              <a:t> uses Term Frequency Inverse Document Frequency (TF-IDF) weighing scheme to extract feature’s advantage and uses Latent Semantic Analysis (LSA) and Linear Discriminant Analysis (LDA) to overcome TF-IDF’s limitation.</a:t>
+            </a:r>
+          </a:p>
+          <a:p>
+            <a:r>
+              <a:rPr lang="en-US" b="1" u="sng" dirty="0"/>
+              <a:t>Paper 2 </a:t>
+            </a:r>
             <a:r>
               <a:rPr lang="en-US" dirty="0"/>
-              <a:t>Paper 2 uses Word embeddings and ensemble strategies to classify text with much higher accuracy.  Word embedding dual neural network word2vector model to map words to real time integers according to syntax and semantic relativity. Ensemble strategies uses voting system to choose a model which provides much more accuracy and training time.</a:t>
+              <a:t>is published in IEEE on 29/07/2019 with DOI number </a:t>
+            </a:r>
+            <a:r>
+              <a:rPr lang="en-IN" dirty="0">
+                <a:hlinkClick r:id="rId3"/>
+              </a:rPr>
+              <a:t>10.1109/INISTA.2019.8778329</a:t>
+            </a:r>
+            <a:r>
+              <a:rPr lang="en-IN" dirty="0"/>
+              <a:t> </a:t>
+            </a:r>
+            <a:r>
+              <a:rPr lang="en-US" dirty="0"/>
+              <a:t>uses Word embeddings and ensemble strategies to classify text with much higher accuracy.  Word embedding dual neural network word2vector model to map words to real time integers according to syntax and semantic relativity. Ensemble strategies uses voting system to choose a model which provides much more accuracy and less training time.</a:t>
             </a:r>
           </a:p>
         </p:txBody>

</xml_diff>

<commit_message>
new architecture diagram creation
</commit_message>
<xml_diff>
--- a/Documentation/Zeroth review ppt.pptx
+++ b/Documentation/Zeroth review ppt.pptx
@@ -260,7 +260,7 @@
             <a:fld id="{156C774F-0ADF-41F2-BA4E-261FF4547D04}" type="datetimeFigureOut">
               <a:rPr lang="en-IN" smtClean="0"/>
               <a:pPr/>
-              <a:t>30-09-2019</a:t>
+              <a:t>01-10-2019</a:t>
             </a:fld>
             <a:endParaRPr lang="en-IN"/>
           </a:p>
@@ -432,7 +432,7 @@
             <a:fld id="{156C774F-0ADF-41F2-BA4E-261FF4547D04}" type="datetimeFigureOut">
               <a:rPr lang="en-IN" smtClean="0"/>
               <a:pPr/>
-              <a:t>30-09-2019</a:t>
+              <a:t>01-10-2019</a:t>
             </a:fld>
             <a:endParaRPr lang="en-IN"/>
           </a:p>
@@ -614,7 +614,7 @@
             <a:fld id="{156C774F-0ADF-41F2-BA4E-261FF4547D04}" type="datetimeFigureOut">
               <a:rPr lang="en-IN" smtClean="0"/>
               <a:pPr/>
-              <a:t>30-09-2019</a:t>
+              <a:t>01-10-2019</a:t>
             </a:fld>
             <a:endParaRPr lang="en-IN"/>
           </a:p>
@@ -796,7 +796,7 @@
             <a:fld id="{156C774F-0ADF-41F2-BA4E-261FF4547D04}" type="datetimeFigureOut">
               <a:rPr lang="en-IN" smtClean="0"/>
               <a:pPr/>
-              <a:t>30-09-2019</a:t>
+              <a:t>01-10-2019</a:t>
             </a:fld>
             <a:endParaRPr lang="en-IN"/>
           </a:p>
@@ -1079,7 +1079,7 @@
             <a:fld id="{156C774F-0ADF-41F2-BA4E-261FF4547D04}" type="datetimeFigureOut">
               <a:rPr lang="en-IN" smtClean="0"/>
               <a:pPr/>
-              <a:t>30-09-2019</a:t>
+              <a:t>01-10-2019</a:t>
             </a:fld>
             <a:endParaRPr lang="en-IN"/>
           </a:p>
@@ -1313,7 +1313,7 @@
             <a:fld id="{156C774F-0ADF-41F2-BA4E-261FF4547D04}" type="datetimeFigureOut">
               <a:rPr lang="en-IN" smtClean="0"/>
               <a:pPr/>
-              <a:t>30-09-2019</a:t>
+              <a:t>01-10-2019</a:t>
             </a:fld>
             <a:endParaRPr lang="en-IN"/>
           </a:p>
@@ -1682,7 +1682,7 @@
             <a:fld id="{156C774F-0ADF-41F2-BA4E-261FF4547D04}" type="datetimeFigureOut">
               <a:rPr lang="en-IN" smtClean="0"/>
               <a:pPr/>
-              <a:t>30-09-2019</a:t>
+              <a:t>01-10-2019</a:t>
             </a:fld>
             <a:endParaRPr lang="en-IN"/>
           </a:p>
@@ -1802,7 +1802,7 @@
             <a:fld id="{156C774F-0ADF-41F2-BA4E-261FF4547D04}" type="datetimeFigureOut">
               <a:rPr lang="en-IN" smtClean="0"/>
               <a:pPr/>
-              <a:t>30-09-2019</a:t>
+              <a:t>01-10-2019</a:t>
             </a:fld>
             <a:endParaRPr lang="en-IN"/>
           </a:p>
@@ -1899,7 +1899,7 @@
             <a:fld id="{156C774F-0ADF-41F2-BA4E-261FF4547D04}" type="datetimeFigureOut">
               <a:rPr lang="en-IN" smtClean="0"/>
               <a:pPr/>
-              <a:t>30-09-2019</a:t>
+              <a:t>01-10-2019</a:t>
             </a:fld>
             <a:endParaRPr lang="en-IN"/>
           </a:p>
@@ -2178,7 +2178,7 @@
             <a:fld id="{156C774F-0ADF-41F2-BA4E-261FF4547D04}" type="datetimeFigureOut">
               <a:rPr lang="en-IN" smtClean="0"/>
               <a:pPr/>
-              <a:t>30-09-2019</a:t>
+              <a:t>01-10-2019</a:t>
             </a:fld>
             <a:endParaRPr lang="en-IN"/>
           </a:p>
@@ -2433,7 +2433,7 @@
             <a:fld id="{156C774F-0ADF-41F2-BA4E-261FF4547D04}" type="datetimeFigureOut">
               <a:rPr lang="en-IN" smtClean="0"/>
               <a:pPr/>
-              <a:t>30-09-2019</a:t>
+              <a:t>01-10-2019</a:t>
             </a:fld>
             <a:endParaRPr lang="en-IN"/>
           </a:p>
@@ -2648,7 +2648,7 @@
             <a:fld id="{156C774F-0ADF-41F2-BA4E-261FF4547D04}" type="datetimeFigureOut">
               <a:rPr lang="en-IN" smtClean="0"/>
               <a:pPr/>
-              <a:t>30-09-2019</a:t>
+              <a:t>01-10-2019</a:t>
             </a:fld>
             <a:endParaRPr lang="en-IN"/>
           </a:p>
@@ -4247,10 +4247,10 @@
       </p:sp>
       <p:pic>
         <p:nvPicPr>
-          <p:cNvPr id="5" name="Content Placeholder 4">
+          <p:cNvPr id="7" name="Content Placeholder 6">
             <a:extLst>
               <a:ext uri="{FF2B5EF4-FFF2-40B4-BE49-F238E27FC236}">
-                <a16:creationId xmlns:a16="http://schemas.microsoft.com/office/drawing/2014/main" id="{5E8130B6-F139-4674-8F5B-4C3CF71D4198}"/>
+                <a16:creationId xmlns:a16="http://schemas.microsoft.com/office/drawing/2014/main" id="{EC53873C-4EBC-4090-BDF6-E53B4B3F9DBE}"/>
               </a:ext>
             </a:extLst>
           </p:cNvPr>
@@ -4275,8 +4275,8 @@
         </p:blipFill>
         <p:spPr>
           <a:xfrm>
-            <a:off x="280173" y="1441389"/>
-            <a:ext cx="8583653" cy="4664944"/>
+            <a:off x="287022" y="1426127"/>
+            <a:ext cx="8569955" cy="4781725"/>
           </a:xfrm>
         </p:spPr>
       </p:pic>

</xml_diff>